<commit_message>
Update Ensembles with Trained Models
</commit_message>
<xml_diff>
--- a/HDM Data Science v0226 _copySven.pptx
+++ b/HDM Data Science v0226 _copySven.pptx
@@ -5,7 +5,7 @@
     <p:sldMasterId id="2147483738" r:id="rId1"/>
   </p:sldMasterIdLst>
   <p:notesMasterIdLst>
-    <p:notesMasterId r:id="rId28"/>
+    <p:notesMasterId r:id="rId27"/>
   </p:notesMasterIdLst>
   <p:sldIdLst>
     <p:sldId id="256" r:id="rId2"/>
@@ -29,11 +29,10 @@
     <p:sldId id="279" r:id="rId20"/>
     <p:sldId id="277" r:id="rId21"/>
     <p:sldId id="275" r:id="rId22"/>
-    <p:sldId id="280" r:id="rId23"/>
-    <p:sldId id="276" r:id="rId24"/>
-    <p:sldId id="272" r:id="rId25"/>
-    <p:sldId id="283" r:id="rId26"/>
-    <p:sldId id="284" r:id="rId27"/>
+    <p:sldId id="276" r:id="rId23"/>
+    <p:sldId id="272" r:id="rId24"/>
+    <p:sldId id="285" r:id="rId25"/>
+    <p:sldId id="284" r:id="rId26"/>
   </p:sldIdLst>
   <p:sldSz cx="12192000" cy="6858000"/>
   <p:notesSz cx="6858000" cy="9144000"/>
@@ -1029,6 +1028,7 @@
         <c:axId val="819983832"/>
         <c:scaling>
           <c:orientation val="minMax"/>
+          <c:max val="1"/>
         </c:scaling>
         <c:delete val="0"/>
         <c:axPos val="l"/>
@@ -2036,6 +2036,7 @@
         <c:axId val="819983832"/>
         <c:scaling>
           <c:orientation val="minMax"/>
+          <c:max val="1"/>
         </c:scaling>
         <c:delete val="0"/>
         <c:axPos val="l"/>
@@ -2239,7 +2240,7 @@
               <c:strCache>
                 <c:ptCount val="1"/>
                 <c:pt idx="0">
-                  <c:v>KNN</c:v>
+                  <c:v>Stacking XG RndForest</c:v>
                 </c:pt>
               </c:strCache>
             </c:strRef>
@@ -2336,13 +2337,13 @@
                 <c:formatCode>0.00%</c:formatCode>
                 <c:ptCount val="3"/>
                 <c:pt idx="0">
-                  <c:v>0.7389</c:v>
+                  <c:v>0.73089999999999999</c:v>
                 </c:pt>
                 <c:pt idx="1">
-                  <c:v>0.80520000000000003</c:v>
+                  <c:v>0.94510000000000005</c:v>
                 </c:pt>
                 <c:pt idx="2">
-                  <c:v>0.62160000000000004</c:v>
+                  <c:v>0.49080000000000001</c:v>
                 </c:pt>
               </c:numCache>
             </c:numRef>
@@ -2362,7 +2363,7 @@
               <c:strCache>
                 <c:ptCount val="1"/>
                 <c:pt idx="0">
-                  <c:v>Log. Regression</c:v>
+                  <c:v>Stracking All</c:v>
                 </c:pt>
               </c:strCache>
             </c:strRef>
@@ -2456,16 +2457,16 @@
             <c:numRef>
               <c:f>Tabelle1!$C$2:$C$4</c:f>
               <c:numCache>
-                <c:formatCode>0.00%</c:formatCode>
+                <c:formatCode>0%</c:formatCode>
                 <c:ptCount val="3"/>
-                <c:pt idx="0">
-                  <c:v>0.58250000000000002</c:v>
+                <c:pt idx="0" formatCode="0.00%">
+                  <c:v>0.68269999999999997</c:v>
                 </c:pt>
                 <c:pt idx="1">
-                  <c:v>0.57779999999999998</c:v>
+                  <c:v>0.74590000000000001</c:v>
                 </c:pt>
                 <c:pt idx="2">
-                  <c:v>0.57389999999999997</c:v>
+                  <c:v>0.55530000000000002</c:v>
                 </c:pt>
               </c:numCache>
             </c:numRef>
@@ -2485,7 +2486,7 @@
               <c:strCache>
                 <c:ptCount val="1"/>
                 <c:pt idx="0">
-                  <c:v>Random Forest</c:v>
+                  <c:v>XGBoost</c:v>
                 </c:pt>
               </c:strCache>
             </c:strRef>
@@ -2582,13 +2583,13 @@
                 <c:formatCode>0.00%</c:formatCode>
                 <c:ptCount val="3"/>
                 <c:pt idx="0">
-                  <c:v>0.8276</c:v>
+                  <c:v>0.68220000000000003</c:v>
                 </c:pt>
                 <c:pt idx="1">
-                  <c:v>0.83840000000000003</c:v>
+                  <c:v>0.67810000000000004</c:v>
                 </c:pt>
                 <c:pt idx="2">
-                  <c:v>0.80620000000000003</c:v>
+                  <c:v>0.69489999999999996</c:v>
                 </c:pt>
               </c:numCache>
             </c:numRef>
@@ -2608,7 +2609,7 @@
               <c:strCache>
                 <c:ptCount val="1"/>
                 <c:pt idx="0">
-                  <c:v>SVM</c:v>
+                  <c:v>Random Forest</c:v>
                 </c:pt>
               </c:strCache>
             </c:strRef>
@@ -2707,13 +2708,13 @@
                 <c:formatCode>0.00%</c:formatCode>
                 <c:ptCount val="3"/>
                 <c:pt idx="0">
-                  <c:v>0.62909999999999999</c:v>
+                  <c:v>0.68179999999999996</c:v>
                 </c:pt>
                 <c:pt idx="1">
-                  <c:v>0.57410000000000005</c:v>
+                  <c:v>0.67359999999999998</c:v>
                 </c:pt>
                 <c:pt idx="2">
-                  <c:v>0.9647</c:v>
+                  <c:v>0.70640000000000003</c:v>
                 </c:pt>
               </c:numCache>
             </c:numRef>
@@ -2733,7 +2734,7 @@
               <c:strCache>
                 <c:ptCount val="1"/>
                 <c:pt idx="0">
-                  <c:v>XGBoost</c:v>
+                  <c:v>Voting All</c:v>
                 </c:pt>
               </c:strCache>
             </c:strRef>
@@ -2832,13 +2833,13 @@
                 <c:formatCode>0.00%</c:formatCode>
                 <c:ptCount val="3"/>
                 <c:pt idx="0">
-                  <c:v>0.76900000000000002</c:v>
+                  <c:v>0.64119999999999999</c:v>
                 </c:pt>
                 <c:pt idx="1">
-                  <c:v>0.77480000000000004</c:v>
+                  <c:v>0.75390000000000001</c:v>
                 </c:pt>
                 <c:pt idx="2">
-                  <c:v>0.75019999999999998</c:v>
+                  <c:v>0.42059999999999997</c:v>
                 </c:pt>
               </c:numCache>
             </c:numRef>
@@ -2846,6 +2847,383 @@
           <c:extLst>
             <c:ext xmlns:c16="http://schemas.microsoft.com/office/drawing/2014/chart" uri="{C3380CC4-5D6E-409C-BE32-E72D297353CC}">
               <c16:uniqueId val="{00000004-CB1C-4803-8449-D9D4C366A9FF}"/>
+            </c:ext>
+          </c:extLst>
+        </c:ser>
+        <c:ser>
+          <c:idx val="5"/>
+          <c:order val="5"/>
+          <c:tx>
+            <c:strRef>
+              <c:f>Tabelle1!$G$1</c:f>
+              <c:strCache>
+                <c:ptCount val="1"/>
+                <c:pt idx="0">
+                  <c:v>KNN</c:v>
+                </c:pt>
+              </c:strCache>
+            </c:strRef>
+          </c:tx>
+          <c:spPr>
+            <a:solidFill>
+              <a:schemeClr val="accent5">
+                <a:lumMod val="60000"/>
+              </a:schemeClr>
+            </a:solidFill>
+            <a:ln>
+              <a:noFill/>
+            </a:ln>
+            <a:effectLst/>
+          </c:spPr>
+          <c:invertIfNegative val="0"/>
+          <c:dLbls>
+            <c:spPr>
+              <a:noFill/>
+              <a:ln>
+                <a:noFill/>
+              </a:ln>
+              <a:effectLst/>
+            </c:spPr>
+            <c:txPr>
+              <a:bodyPr rot="0" spcFirstLastPara="1" vertOverflow="ellipsis" vert="horz" wrap="square" lIns="38100" tIns="19050" rIns="38100" bIns="19050" anchor="ctr" anchorCtr="1">
+                <a:spAutoFit/>
+              </a:bodyPr>
+              <a:lstStyle/>
+              <a:p>
+                <a:pPr>
+                  <a:defRPr sz="1197" b="0" i="0" u="none" strike="noStrike" kern="1200" baseline="0">
+                    <a:solidFill>
+                      <a:schemeClr val="tx1">
+                        <a:lumMod val="75000"/>
+                        <a:lumOff val="25000"/>
+                      </a:schemeClr>
+                    </a:solidFill>
+                    <a:latin typeface="+mn-lt"/>
+                    <a:ea typeface="+mn-ea"/>
+                    <a:cs typeface="+mn-cs"/>
+                  </a:defRPr>
+                </a:pPr>
+                <a:endParaRPr lang="de-DE"/>
+              </a:p>
+            </c:txPr>
+            <c:dLblPos val="outEnd"/>
+            <c:showLegendKey val="0"/>
+            <c:showVal val="1"/>
+            <c:showCatName val="0"/>
+            <c:showSerName val="0"/>
+            <c:showPercent val="0"/>
+            <c:showBubbleSize val="0"/>
+            <c:showLeaderLines val="0"/>
+            <c:extLst>
+              <c:ext xmlns:c15="http://schemas.microsoft.com/office/drawing/2012/chart" uri="{CE6537A1-D6FC-4f65-9D91-7224C49458BB}">
+                <c15:showLeaderLines val="1"/>
+                <c15:leaderLines>
+                  <c:spPr>
+                    <a:ln w="9525" cap="flat" cmpd="sng" algn="ctr">
+                      <a:solidFill>
+                        <a:schemeClr val="tx1">
+                          <a:lumMod val="35000"/>
+                          <a:lumOff val="65000"/>
+                        </a:schemeClr>
+                      </a:solidFill>
+                      <a:round/>
+                    </a:ln>
+                    <a:effectLst/>
+                  </c:spPr>
+                </c15:leaderLines>
+              </c:ext>
+            </c:extLst>
+          </c:dLbls>
+          <c:cat>
+            <c:strRef>
+              <c:f>Tabelle1!$A$2:$A$4</c:f>
+              <c:strCache>
+                <c:ptCount val="3"/>
+                <c:pt idx="0">
+                  <c:v>Accuracy</c:v>
+                </c:pt>
+                <c:pt idx="1">
+                  <c:v>Precision</c:v>
+                </c:pt>
+                <c:pt idx="2">
+                  <c:v>Recall</c:v>
+                </c:pt>
+              </c:strCache>
+            </c:strRef>
+          </c:cat>
+          <c:val>
+            <c:numRef>
+              <c:f>Tabelle1!$G$2:$G$4</c:f>
+              <c:numCache>
+                <c:formatCode>0.00%</c:formatCode>
+                <c:ptCount val="3"/>
+                <c:pt idx="0">
+                  <c:v>0.6079</c:v>
+                </c:pt>
+                <c:pt idx="1">
+                  <c:v>0.58720000000000006</c:v>
+                </c:pt>
+                <c:pt idx="2">
+                  <c:v>0.72899999999999998</c:v>
+                </c:pt>
+              </c:numCache>
+            </c:numRef>
+          </c:val>
+          <c:extLst>
+            <c:ext xmlns:c16="http://schemas.microsoft.com/office/drawing/2014/chart" uri="{C3380CC4-5D6E-409C-BE32-E72D297353CC}">
+              <c16:uniqueId val="{00000000-06AE-42F0-BE62-1B571509FCEA}"/>
+            </c:ext>
+          </c:extLst>
+        </c:ser>
+        <c:ser>
+          <c:idx val="6"/>
+          <c:order val="6"/>
+          <c:tx>
+            <c:strRef>
+              <c:f>Tabelle1!$H$1</c:f>
+              <c:strCache>
+                <c:ptCount val="1"/>
+                <c:pt idx="0">
+                  <c:v>Log. Regression</c:v>
+                </c:pt>
+              </c:strCache>
+            </c:strRef>
+          </c:tx>
+          <c:spPr>
+            <a:solidFill>
+              <a:schemeClr val="accent1">
+                <a:lumMod val="80000"/>
+                <a:lumOff val="20000"/>
+              </a:schemeClr>
+            </a:solidFill>
+            <a:ln>
+              <a:noFill/>
+            </a:ln>
+            <a:effectLst/>
+          </c:spPr>
+          <c:invertIfNegative val="0"/>
+          <c:dLbls>
+            <c:spPr>
+              <a:noFill/>
+              <a:ln>
+                <a:noFill/>
+              </a:ln>
+              <a:effectLst/>
+            </c:spPr>
+            <c:txPr>
+              <a:bodyPr rot="0" spcFirstLastPara="1" vertOverflow="ellipsis" vert="horz" wrap="square" lIns="38100" tIns="19050" rIns="38100" bIns="19050" anchor="ctr" anchorCtr="1">
+                <a:spAutoFit/>
+              </a:bodyPr>
+              <a:lstStyle/>
+              <a:p>
+                <a:pPr>
+                  <a:defRPr sz="1197" b="0" i="0" u="none" strike="noStrike" kern="1200" baseline="0">
+                    <a:solidFill>
+                      <a:schemeClr val="tx1">
+                        <a:lumMod val="75000"/>
+                        <a:lumOff val="25000"/>
+                      </a:schemeClr>
+                    </a:solidFill>
+                    <a:latin typeface="+mn-lt"/>
+                    <a:ea typeface="+mn-ea"/>
+                    <a:cs typeface="+mn-cs"/>
+                  </a:defRPr>
+                </a:pPr>
+                <a:endParaRPr lang="de-DE"/>
+              </a:p>
+            </c:txPr>
+            <c:dLblPos val="outEnd"/>
+            <c:showLegendKey val="0"/>
+            <c:showVal val="1"/>
+            <c:showCatName val="0"/>
+            <c:showSerName val="0"/>
+            <c:showPercent val="0"/>
+            <c:showBubbleSize val="0"/>
+            <c:showLeaderLines val="0"/>
+            <c:extLst>
+              <c:ext xmlns:c15="http://schemas.microsoft.com/office/drawing/2012/chart" uri="{CE6537A1-D6FC-4f65-9D91-7224C49458BB}">
+                <c15:showLeaderLines val="1"/>
+                <c15:leaderLines>
+                  <c:spPr>
+                    <a:ln w="9525" cap="flat" cmpd="sng" algn="ctr">
+                      <a:solidFill>
+                        <a:schemeClr val="tx1">
+                          <a:lumMod val="35000"/>
+                          <a:lumOff val="65000"/>
+                        </a:schemeClr>
+                      </a:solidFill>
+                      <a:round/>
+                    </a:ln>
+                    <a:effectLst/>
+                  </c:spPr>
+                </c15:leaderLines>
+              </c:ext>
+            </c:extLst>
+          </c:dLbls>
+          <c:cat>
+            <c:strRef>
+              <c:f>Tabelle1!$A$2:$A$4</c:f>
+              <c:strCache>
+                <c:ptCount val="3"/>
+                <c:pt idx="0">
+                  <c:v>Accuracy</c:v>
+                </c:pt>
+                <c:pt idx="1">
+                  <c:v>Precision</c:v>
+                </c:pt>
+                <c:pt idx="2">
+                  <c:v>Recall</c:v>
+                </c:pt>
+              </c:strCache>
+            </c:strRef>
+          </c:cat>
+          <c:val>
+            <c:numRef>
+              <c:f>Tabelle1!$H$2:$H$4</c:f>
+              <c:numCache>
+                <c:formatCode>0.00%</c:formatCode>
+                <c:ptCount val="3"/>
+                <c:pt idx="0">
+                  <c:v>0.60740000000000005</c:v>
+                </c:pt>
+                <c:pt idx="1">
+                  <c:v>0.5968</c:v>
+                </c:pt>
+                <c:pt idx="2">
+                  <c:v>0.68710000000000004</c:v>
+                </c:pt>
+              </c:numCache>
+            </c:numRef>
+          </c:val>
+          <c:extLst>
+            <c:ext xmlns:c16="http://schemas.microsoft.com/office/drawing/2014/chart" uri="{C3380CC4-5D6E-409C-BE32-E72D297353CC}">
+              <c16:uniqueId val="{00000000-6F8B-40BE-A1A0-98B4AA3C9139}"/>
+            </c:ext>
+          </c:extLst>
+        </c:ser>
+        <c:ser>
+          <c:idx val="7"/>
+          <c:order val="7"/>
+          <c:tx>
+            <c:strRef>
+              <c:f>Tabelle1!$I$1</c:f>
+              <c:strCache>
+                <c:ptCount val="1"/>
+                <c:pt idx="0">
+                  <c:v>Voting XG RndForest</c:v>
+                </c:pt>
+              </c:strCache>
+            </c:strRef>
+          </c:tx>
+          <c:spPr>
+            <a:solidFill>
+              <a:schemeClr val="accent3">
+                <a:lumMod val="80000"/>
+                <a:lumOff val="20000"/>
+              </a:schemeClr>
+            </a:solidFill>
+            <a:ln>
+              <a:noFill/>
+            </a:ln>
+            <a:effectLst/>
+          </c:spPr>
+          <c:invertIfNegative val="0"/>
+          <c:dLbls>
+            <c:spPr>
+              <a:noFill/>
+              <a:ln>
+                <a:noFill/>
+              </a:ln>
+              <a:effectLst/>
+            </c:spPr>
+            <c:txPr>
+              <a:bodyPr rot="0" spcFirstLastPara="1" vertOverflow="ellipsis" vert="horz" wrap="square" lIns="38100" tIns="19050" rIns="38100" bIns="19050" anchor="ctr" anchorCtr="1">
+                <a:spAutoFit/>
+              </a:bodyPr>
+              <a:lstStyle/>
+              <a:p>
+                <a:pPr>
+                  <a:defRPr sz="1197" b="0" i="0" u="none" strike="noStrike" kern="1200" baseline="0">
+                    <a:solidFill>
+                      <a:schemeClr val="tx1">
+                        <a:lumMod val="75000"/>
+                        <a:lumOff val="25000"/>
+                      </a:schemeClr>
+                    </a:solidFill>
+                    <a:latin typeface="+mn-lt"/>
+                    <a:ea typeface="+mn-ea"/>
+                    <a:cs typeface="+mn-cs"/>
+                  </a:defRPr>
+                </a:pPr>
+                <a:endParaRPr lang="de-DE"/>
+              </a:p>
+            </c:txPr>
+            <c:dLblPos val="outEnd"/>
+            <c:showLegendKey val="0"/>
+            <c:showVal val="1"/>
+            <c:showCatName val="0"/>
+            <c:showSerName val="0"/>
+            <c:showPercent val="0"/>
+            <c:showBubbleSize val="0"/>
+            <c:showLeaderLines val="0"/>
+            <c:extLst>
+              <c:ext xmlns:c15="http://schemas.microsoft.com/office/drawing/2012/chart" uri="{CE6537A1-D6FC-4f65-9D91-7224C49458BB}">
+                <c15:showLeaderLines val="1"/>
+                <c15:leaderLines>
+                  <c:spPr>
+                    <a:ln w="9525" cap="flat" cmpd="sng" algn="ctr">
+                      <a:solidFill>
+                        <a:schemeClr val="tx1">
+                          <a:lumMod val="35000"/>
+                          <a:lumOff val="65000"/>
+                        </a:schemeClr>
+                      </a:solidFill>
+                      <a:round/>
+                    </a:ln>
+                    <a:effectLst/>
+                  </c:spPr>
+                </c15:leaderLines>
+              </c:ext>
+            </c:extLst>
+          </c:dLbls>
+          <c:cat>
+            <c:strRef>
+              <c:f>Tabelle1!$A$2:$A$4</c:f>
+              <c:strCache>
+                <c:ptCount val="3"/>
+                <c:pt idx="0">
+                  <c:v>Accuracy</c:v>
+                </c:pt>
+                <c:pt idx="1">
+                  <c:v>Precision</c:v>
+                </c:pt>
+                <c:pt idx="2">
+                  <c:v>Recall</c:v>
+                </c:pt>
+              </c:strCache>
+            </c:strRef>
+          </c:cat>
+          <c:val>
+            <c:numRef>
+              <c:f>Tabelle1!$I$2:$I$4</c:f>
+              <c:numCache>
+                <c:formatCode>0.00%</c:formatCode>
+                <c:ptCount val="3"/>
+                <c:pt idx="0">
+                  <c:v>0.5</c:v>
+                </c:pt>
+                <c:pt idx="1">
+                  <c:v>1</c:v>
+                </c:pt>
+                <c:pt idx="2">
+                  <c:v>0</c:v>
+                </c:pt>
+              </c:numCache>
+            </c:numRef>
+          </c:val>
+          <c:extLst>
+            <c:ext xmlns:c16="http://schemas.microsoft.com/office/drawing/2014/chart" uri="{C3380CC4-5D6E-409C-BE32-E72D297353CC}">
+              <c16:uniqueId val="{00000001-6F8B-40BE-A1A0-98B4AA3C9139}"/>
             </c:ext>
           </c:extLst>
         </c:ser>
@@ -2918,6 +3296,7 @@
         <c:axId val="819983832"/>
         <c:scaling>
           <c:orientation val="minMax"/>
+          <c:max val="1"/>
         </c:scaling>
         <c:delete val="0"/>
         <c:axPos val="l"/>
@@ -3070,15 +3449,23 @@
               </a:defRPr>
             </a:pPr>
             <a:r>
-              <a:rPr lang="de-DE"/>
-              <a:t>Model </a:t>
-            </a:r>
-            <a:r>
-              <a:rPr lang="de-DE" err="1"/>
+              <a:rPr lang="de-DE" dirty="0"/>
+              <a:t>Model  </a:t>
+            </a:r>
+            <a:r>
+              <a:rPr lang="de-DE" dirty="0" err="1"/>
+              <a:t>weights</a:t>
+            </a:r>
+            <a:r>
+              <a:rPr lang="de-DE" baseline="0" dirty="0"/>
+              <a:t> </a:t>
+            </a:r>
+            <a:r>
+              <a:rPr lang="de-DE" baseline="0" dirty="0" err="1"/>
               <a:t>comparison</a:t>
             </a:r>
             <a:r>
-              <a:rPr lang="de-DE"/>
+              <a:rPr lang="de-DE" dirty="0"/>
               <a:t> </a:t>
             </a:r>
           </a:p>
@@ -4703,7 +5090,6 @@
           </c:extLst>
         </c:ser>
         <c:dLbls>
-          <c:dLblPos val="outEnd"/>
           <c:showLegendKey val="0"/>
           <c:showVal val="0"/>
           <c:showCatName val="0"/>
@@ -7637,7 +8023,7 @@
           <a:p>
             <a:fld id="{8CE265D3-6F69-46A3-BC22-BD3030E0EBE5}" type="slidenum">
               <a:rPr lang="de-DE" smtClean="0"/>
-              <a:t>22</a:t>
+              <a:t>23</a:t>
             </a:fld>
             <a:endParaRPr lang="de-DE"/>
           </a:p>
@@ -7646,7 +8032,7 @@
     </p:spTree>
     <p:extLst>
       <p:ext uri="{BB962C8B-B14F-4D97-AF65-F5344CB8AC3E}">
-        <p14:creationId xmlns:p14="http://schemas.microsoft.com/office/powerpoint/2010/main" val="2384088561"/>
+        <p14:creationId xmlns:p14="http://schemas.microsoft.com/office/powerpoint/2010/main" val="3913961450"/>
       </p:ext>
     </p:extLst>
   </p:cSld>
@@ -7730,7 +8116,7 @@
     </p:spTree>
     <p:extLst>
       <p:ext uri="{BB962C8B-B14F-4D97-AF65-F5344CB8AC3E}">
-        <p14:creationId xmlns:p14="http://schemas.microsoft.com/office/powerpoint/2010/main" val="3913961450"/>
+        <p14:creationId xmlns:p14="http://schemas.microsoft.com/office/powerpoint/2010/main" val="3488712602"/>
       </p:ext>
     </p:extLst>
   </p:cSld>
@@ -7806,90 +8192,6 @@
             <a:fld id="{8CE265D3-6F69-46A3-BC22-BD3030E0EBE5}" type="slidenum">
               <a:rPr lang="de-DE" smtClean="0"/>
               <a:t>25</a:t>
-            </a:fld>
-            <a:endParaRPr lang="de-DE"/>
-          </a:p>
-        </p:txBody>
-      </p:sp>
-    </p:spTree>
-    <p:extLst>
-      <p:ext uri="{BB962C8B-B14F-4D97-AF65-F5344CB8AC3E}">
-        <p14:creationId xmlns:p14="http://schemas.microsoft.com/office/powerpoint/2010/main" val="4097581328"/>
-      </p:ext>
-    </p:extLst>
-  </p:cSld>
-  <p:clrMapOvr>
-    <a:masterClrMapping/>
-  </p:clrMapOvr>
-</p:notes>
-</file>
-
-<file path=ppt/notesSlides/notesSlide14.xml><?xml version="1.0" encoding="utf-8"?>
-<p:notes xmlns:a="http://schemas.openxmlformats.org/drawingml/2006/main" xmlns:r="http://schemas.openxmlformats.org/officeDocument/2006/relationships" xmlns:p="http://schemas.openxmlformats.org/presentationml/2006/main">
-  <p:cSld>
-    <p:spTree>
-      <p:nvGrpSpPr>
-        <p:cNvPr id="1" name=""/>
-        <p:cNvGrpSpPr/>
-        <p:nvPr/>
-      </p:nvGrpSpPr>
-      <p:grpSpPr>
-        <a:xfrm>
-          <a:off x="0" y="0"/>
-          <a:ext cx="0" cy="0"/>
-          <a:chOff x="0" y="0"/>
-          <a:chExt cx="0" cy="0"/>
-        </a:xfrm>
-      </p:grpSpPr>
-      <p:sp>
-        <p:nvSpPr>
-          <p:cNvPr id="2" name="Folienbildplatzhalter 1"/>
-          <p:cNvSpPr>
-            <a:spLocks noGrp="1" noRot="1" noChangeAspect="1"/>
-          </p:cNvSpPr>
-          <p:nvPr>
-            <p:ph type="sldImg"/>
-          </p:nvPr>
-        </p:nvSpPr>
-        <p:spPr/>
-      </p:sp>
-      <p:sp>
-        <p:nvSpPr>
-          <p:cNvPr id="3" name="Notizenplatzhalter 2"/>
-          <p:cNvSpPr>
-            <a:spLocks noGrp="1"/>
-          </p:cNvSpPr>
-          <p:nvPr>
-            <p:ph type="body" idx="1"/>
-          </p:nvPr>
-        </p:nvSpPr>
-        <p:spPr/>
-        <p:txBody>
-          <a:bodyPr/>
-          <a:lstStyle/>
-          <a:p>
-            <a:endParaRPr lang="de-DE" dirty="0"/>
-          </a:p>
-        </p:txBody>
-      </p:sp>
-      <p:sp>
-        <p:nvSpPr>
-          <p:cNvPr id="4" name="Foliennummernplatzhalter 3"/>
-          <p:cNvSpPr>
-            <a:spLocks noGrp="1"/>
-          </p:cNvSpPr>
-          <p:nvPr>
-            <p:ph type="sldNum" sz="quarter" idx="5"/>
-          </p:nvPr>
-        </p:nvSpPr>
-        <p:spPr/>
-        <p:txBody>
-          <a:bodyPr/>
-          <a:lstStyle/>
-          <a:p>
-            <a:fld id="{8CE265D3-6F69-46A3-BC22-BD3030E0EBE5}" type="slidenum">
-              <a:rPr lang="de-DE" smtClean="0"/>
-              <a:t>26</a:t>
             </a:fld>
             <a:endParaRPr lang="de-DE"/>
           </a:p>
@@ -17868,393 +18170,6 @@
           <a:chExt cx="0" cy="0"/>
         </a:xfrm>
       </p:grpSpPr>
-      <p:sp useBgFill="1">
-        <p:nvSpPr>
-          <p:cNvPr id="19" name="Rectangle 18">
-            <a:extLst>
-              <a:ext uri="{FF2B5EF4-FFF2-40B4-BE49-F238E27FC236}">
-                <a16:creationId xmlns:a16="http://schemas.microsoft.com/office/drawing/2014/main" id="{FBE7ADA7-D199-447B-83C7-7FB0F7BFE027}"/>
-              </a:ext>
-              <a:ext uri="{C183D7F6-B498-43B3-948B-1728B52AA6E4}">
-                <adec:decorative xmlns:adec="http://schemas.microsoft.com/office/drawing/2017/decorative" val="1"/>
-              </a:ext>
-            </a:extLst>
-          </p:cNvPr>
-          <p:cNvSpPr>
-            <a:spLocks noGrp="1" noRot="1" noChangeAspect="1" noMove="1" noResize="1" noEditPoints="1" noAdjustHandles="1" noChangeArrowheads="1" noChangeShapeType="1" noTextEdit="1"/>
-          </p:cNvSpPr>
-          <p:nvPr>
-            <p:extLst>
-              <p:ext uri="{386F3935-93C4-4BCD-93E2-E3B085C9AB24}">
-                <p16:designElem xmlns:p16="http://schemas.microsoft.com/office/powerpoint/2015/main" val="1"/>
-              </p:ext>
-            </p:extLst>
-          </p:nvPr>
-        </p:nvSpPr>
-        <p:spPr>
-          <a:xfrm>
-            <a:off x="0" y="0"/>
-            <a:ext cx="12192000" cy="6858000"/>
-          </a:xfrm>
-          <a:prstGeom prst="rect">
-            <a:avLst/>
-          </a:prstGeom>
-          <a:ln>
-            <a:noFill/>
-          </a:ln>
-        </p:spPr>
-        <p:style>
-          <a:lnRef idx="2">
-            <a:schemeClr val="accent1">
-              <a:shade val="50000"/>
-            </a:schemeClr>
-          </a:lnRef>
-          <a:fillRef idx="1">
-            <a:schemeClr val="accent1"/>
-          </a:fillRef>
-          <a:effectRef idx="0">
-            <a:schemeClr val="accent1"/>
-          </a:effectRef>
-          <a:fontRef idx="minor">
-            <a:schemeClr val="lt1"/>
-          </a:fontRef>
-        </p:style>
-        <p:txBody>
-          <a:bodyPr rtlCol="0" anchor="ctr"/>
-          <a:lstStyle/>
-          <a:p>
-            <a:pPr algn="ctr"/>
-            <a:endParaRPr lang="en-US"/>
-          </a:p>
-        </p:txBody>
-      </p:sp>
-      <p:sp>
-        <p:nvSpPr>
-          <p:cNvPr id="21" name="Rectangle 20">
-            <a:extLst>
-              <a:ext uri="{FF2B5EF4-FFF2-40B4-BE49-F238E27FC236}">
-                <a16:creationId xmlns:a16="http://schemas.microsoft.com/office/drawing/2014/main" id="{CF7BDE25-3D6C-4A65-AE1F-17B3C31DC9DF}"/>
-              </a:ext>
-              <a:ext uri="{C183D7F6-B498-43B3-948B-1728B52AA6E4}">
-                <adec:decorative xmlns:adec="http://schemas.microsoft.com/office/drawing/2017/decorative" val="1"/>
-              </a:ext>
-            </a:extLst>
-          </p:cNvPr>
-          <p:cNvSpPr>
-            <a:spLocks noGrp="1" noRot="1" noChangeAspect="1" noMove="1" noResize="1" noEditPoints="1" noAdjustHandles="1" noChangeArrowheads="1" noChangeShapeType="1" noTextEdit="1"/>
-          </p:cNvSpPr>
-          <p:nvPr>
-            <p:extLst>
-              <p:ext uri="{386F3935-93C4-4BCD-93E2-E3B085C9AB24}">
-                <p16:designElem xmlns:p16="http://schemas.microsoft.com/office/powerpoint/2015/main" val="1"/>
-              </p:ext>
-            </p:extLst>
-          </p:nvPr>
-        </p:nvSpPr>
-        <p:spPr>
-          <a:xfrm>
-            <a:off x="446534" y="4561150"/>
-            <a:ext cx="3703320" cy="94997"/>
-          </a:xfrm>
-          <a:prstGeom prst="rect">
-            <a:avLst/>
-          </a:prstGeom>
-          <a:solidFill>
-            <a:srgbClr val="465359"/>
-          </a:solidFill>
-          <a:ln>
-            <a:noFill/>
-          </a:ln>
-          <a:effectLst/>
-        </p:spPr>
-        <p:style>
-          <a:lnRef idx="1">
-            <a:schemeClr val="accent1"/>
-          </a:lnRef>
-          <a:fillRef idx="3">
-            <a:schemeClr val="accent1"/>
-          </a:fillRef>
-          <a:effectRef idx="2">
-            <a:schemeClr val="accent1"/>
-          </a:effectRef>
-          <a:fontRef idx="minor">
-            <a:schemeClr val="lt1"/>
-          </a:fontRef>
-        </p:style>
-      </p:sp>
-      <p:sp>
-        <p:nvSpPr>
-          <p:cNvPr id="23" name="Rectangle 22">
-            <a:extLst>
-              <a:ext uri="{FF2B5EF4-FFF2-40B4-BE49-F238E27FC236}">
-                <a16:creationId xmlns:a16="http://schemas.microsoft.com/office/drawing/2014/main" id="{5CD6E934-390A-4282-9C06-550879EA88ED}"/>
-              </a:ext>
-              <a:ext uri="{C183D7F6-B498-43B3-948B-1728B52AA6E4}">
-                <adec:decorative xmlns:adec="http://schemas.microsoft.com/office/drawing/2017/decorative" val="1"/>
-              </a:ext>
-            </a:extLst>
-          </p:cNvPr>
-          <p:cNvSpPr>
-            <a:spLocks noGrp="1" noRot="1" noChangeAspect="1" noMove="1" noResize="1" noEditPoints="1" noAdjustHandles="1" noChangeArrowheads="1" noChangeShapeType="1" noTextEdit="1"/>
-          </p:cNvSpPr>
-          <p:nvPr>
-            <p:extLst>
-              <p:ext uri="{386F3935-93C4-4BCD-93E2-E3B085C9AB24}">
-                <p16:designElem xmlns:p16="http://schemas.microsoft.com/office/powerpoint/2015/main" val="1"/>
-              </p:ext>
-            </p:extLst>
-          </p:nvPr>
-        </p:nvSpPr>
-        <p:spPr>
-          <a:xfrm>
-            <a:off x="4241830" y="4561150"/>
-            <a:ext cx="3703320" cy="91440"/>
-          </a:xfrm>
-          <a:prstGeom prst="rect">
-            <a:avLst/>
-          </a:prstGeom>
-          <a:solidFill>
-            <a:schemeClr val="accent1"/>
-          </a:solidFill>
-          <a:ln>
-            <a:noFill/>
-          </a:ln>
-          <a:effectLst/>
-        </p:spPr>
-        <p:style>
-          <a:lnRef idx="1">
-            <a:schemeClr val="accent1"/>
-          </a:lnRef>
-          <a:fillRef idx="3">
-            <a:schemeClr val="accent1"/>
-          </a:fillRef>
-          <a:effectRef idx="2">
-            <a:schemeClr val="accent1"/>
-          </a:effectRef>
-          <a:fontRef idx="minor">
-            <a:schemeClr val="lt1"/>
-          </a:fontRef>
-        </p:style>
-      </p:sp>
-      <p:sp>
-        <p:nvSpPr>
-          <p:cNvPr id="25" name="Rectangle 24">
-            <a:extLst>
-              <a:ext uri="{FF2B5EF4-FFF2-40B4-BE49-F238E27FC236}">
-                <a16:creationId xmlns:a16="http://schemas.microsoft.com/office/drawing/2014/main" id="{5207C480-2ED1-4822-91D1-C253F6887113}"/>
-              </a:ext>
-              <a:ext uri="{C183D7F6-B498-43B3-948B-1728B52AA6E4}">
-                <adec:decorative xmlns:adec="http://schemas.microsoft.com/office/drawing/2017/decorative" val="1"/>
-              </a:ext>
-            </a:extLst>
-          </p:cNvPr>
-          <p:cNvSpPr>
-            <a:spLocks noGrp="1" noRot="1" noChangeAspect="1" noMove="1" noResize="1" noEditPoints="1" noAdjustHandles="1" noChangeArrowheads="1" noChangeShapeType="1" noTextEdit="1"/>
-          </p:cNvSpPr>
-          <p:nvPr>
-            <p:extLst>
-              <p:ext uri="{386F3935-93C4-4BCD-93E2-E3B085C9AB24}">
-                <p16:designElem xmlns:p16="http://schemas.microsoft.com/office/powerpoint/2015/main" val="1"/>
-              </p:ext>
-            </p:extLst>
-          </p:nvPr>
-        </p:nvSpPr>
-        <p:spPr>
-          <a:xfrm>
-            <a:off x="8042147" y="4557593"/>
-            <a:ext cx="3703320" cy="98554"/>
-          </a:xfrm>
-          <a:prstGeom prst="rect">
-            <a:avLst/>
-          </a:prstGeom>
-          <a:solidFill>
-            <a:srgbClr val="969FA7"/>
-          </a:solidFill>
-          <a:ln>
-            <a:noFill/>
-          </a:ln>
-          <a:effectLst/>
-        </p:spPr>
-        <p:style>
-          <a:lnRef idx="1">
-            <a:schemeClr val="accent1"/>
-          </a:lnRef>
-          <a:fillRef idx="3">
-            <a:schemeClr val="accent1"/>
-          </a:fillRef>
-          <a:effectRef idx="2">
-            <a:schemeClr val="accent1"/>
-          </a:effectRef>
-          <a:fontRef idx="minor">
-            <a:schemeClr val="lt1"/>
-          </a:fontRef>
-        </p:style>
-      </p:sp>
-      <p:sp>
-        <p:nvSpPr>
-          <p:cNvPr id="27" name="Rectangle 26">
-            <a:extLst>
-              <a:ext uri="{FF2B5EF4-FFF2-40B4-BE49-F238E27FC236}">
-                <a16:creationId xmlns:a16="http://schemas.microsoft.com/office/drawing/2014/main" id="{A62FAE06-6CFA-41A5-8807-43DD2423C568}"/>
-              </a:ext>
-              <a:ext uri="{C183D7F6-B498-43B3-948B-1728B52AA6E4}">
-                <adec:decorative xmlns:adec="http://schemas.microsoft.com/office/drawing/2017/decorative" val="1"/>
-              </a:ext>
-            </a:extLst>
-          </p:cNvPr>
-          <p:cNvSpPr>
-            <a:spLocks noGrp="1" noRot="1" noChangeAspect="1" noMove="1" noResize="1" noEditPoints="1" noAdjustHandles="1" noChangeArrowheads="1" noChangeShapeType="1" noTextEdit="1"/>
-          </p:cNvSpPr>
-          <p:nvPr>
-            <p:extLst>
-              <p:ext uri="{386F3935-93C4-4BCD-93E2-E3B085C9AB24}">
-                <p16:designElem xmlns:p16="http://schemas.microsoft.com/office/powerpoint/2015/main" val="1"/>
-              </p:ext>
-            </p:extLst>
-          </p:nvPr>
-        </p:nvSpPr>
-        <p:spPr>
-          <a:xfrm>
-            <a:off x="440286" y="4734570"/>
-            <a:ext cx="11309338" cy="1656683"/>
-          </a:xfrm>
-          <a:prstGeom prst="rect">
-            <a:avLst/>
-          </a:prstGeom>
-          <a:solidFill>
-            <a:srgbClr val="465359"/>
-          </a:solidFill>
-          <a:ln>
-            <a:noFill/>
-          </a:ln>
-          <a:effectLst/>
-        </p:spPr>
-        <p:style>
-          <a:lnRef idx="1">
-            <a:schemeClr val="accent1"/>
-          </a:lnRef>
-          <a:fillRef idx="3">
-            <a:schemeClr val="accent1"/>
-          </a:fillRef>
-          <a:effectRef idx="2">
-            <a:schemeClr val="accent1"/>
-          </a:effectRef>
-          <a:fontRef idx="minor">
-            <a:schemeClr val="lt1"/>
-          </a:fontRef>
-        </p:style>
-      </p:sp>
-      <p:sp>
-        <p:nvSpPr>
-          <p:cNvPr id="2" name="Titel 1"/>
-          <p:cNvSpPr>
-            <a:spLocks noGrp="1"/>
-          </p:cNvSpPr>
-          <p:nvPr>
-            <p:ph type="title"/>
-          </p:nvPr>
-        </p:nvSpPr>
-        <p:spPr>
-          <a:xfrm>
-            <a:off x="581192" y="4929704"/>
-            <a:ext cx="10925008" cy="1245166"/>
-          </a:xfrm>
-        </p:spPr>
-        <p:txBody>
-          <a:bodyPr anchor="ctr">
-            <a:normAutofit/>
-          </a:bodyPr>
-          <a:lstStyle/>
-          <a:p>
-            <a:r>
-              <a:rPr lang="en-GB" dirty="0">
-                <a:solidFill>
-                  <a:srgbClr val="FFFEFF"/>
-                </a:solidFill>
-              </a:rPr>
-              <a:t>Second Iteration</a:t>
-            </a:r>
-            <a:br>
-              <a:rPr lang="en-GB" dirty="0">
-                <a:solidFill>
-                  <a:srgbClr val="FFFEFF"/>
-                </a:solidFill>
-              </a:rPr>
-            </a:br>
-            <a:r>
-              <a:rPr lang="en-GB" dirty="0">
-                <a:solidFill>
-                  <a:srgbClr val="FFFEFF"/>
-                </a:solidFill>
-              </a:rPr>
-              <a:t>Random forest is the best performing model</a:t>
-            </a:r>
-          </a:p>
-        </p:txBody>
-      </p:sp>
-      <p:graphicFrame>
-        <p:nvGraphicFramePr>
-          <p:cNvPr id="14" name="Inhaltsplatzhalter 13"/>
-          <p:cNvGraphicFramePr>
-            <a:graphicFrameLocks noGrp="1"/>
-          </p:cNvGraphicFramePr>
-          <p:nvPr>
-            <p:ph idx="1"/>
-            <p:extLst>
-              <p:ext uri="{D42A27DB-BD31-4B8C-83A1-F6EECF244321}">
-                <p14:modId xmlns:p14="http://schemas.microsoft.com/office/powerpoint/2010/main" val="1929921343"/>
-              </p:ext>
-            </p:extLst>
-          </p:nvPr>
-        </p:nvGraphicFramePr>
-        <p:xfrm>
-          <a:off x="581025" y="728488"/>
-          <a:ext cx="11029950" cy="3560291"/>
-        </p:xfrm>
-        <a:graphic>
-          <a:graphicData uri="http://schemas.openxmlformats.org/drawingml/2006/chart">
-            <c:chart xmlns:c="http://schemas.openxmlformats.org/drawingml/2006/chart" xmlns:r="http://schemas.openxmlformats.org/officeDocument/2006/relationships" r:id="rId3"/>
-          </a:graphicData>
-        </a:graphic>
-      </p:graphicFrame>
-    </p:spTree>
-    <p:extLst>
-      <p:ext uri="{BB962C8B-B14F-4D97-AF65-F5344CB8AC3E}">
-        <p14:creationId xmlns:p14="http://schemas.microsoft.com/office/powerpoint/2010/main" val="525597324"/>
-      </p:ext>
-    </p:extLst>
-  </p:cSld>
-  <p:clrMapOvr>
-    <a:masterClrMapping/>
-  </p:clrMapOvr>
-</p:sld>
-</file>
-
-<file path=ppt/slides/slide23.xml><?xml version="1.0" encoding="utf-8"?>
-<p:sld xmlns:a="http://schemas.openxmlformats.org/drawingml/2006/main" xmlns:r="http://schemas.openxmlformats.org/officeDocument/2006/relationships" xmlns:p="http://schemas.openxmlformats.org/presentationml/2006/main">
-  <p:cSld>
-    <p:bg>
-      <p:bgPr>
-        <a:solidFill>
-          <a:schemeClr val="bg1"/>
-        </a:solidFill>
-        <a:effectLst/>
-      </p:bgPr>
-    </p:bg>
-    <p:spTree>
-      <p:nvGrpSpPr>
-        <p:cNvPr id="1" name=""/>
-        <p:cNvGrpSpPr/>
-        <p:nvPr/>
-      </p:nvGrpSpPr>
-      <p:grpSpPr>
-        <a:xfrm>
-          <a:off x="0" y="0"/>
-          <a:ext cx="0" cy="0"/>
-          <a:chOff x="0" y="0"/>
-          <a:chExt cx="0" cy="0"/>
-        </a:xfrm>
-      </p:grpSpPr>
       <p:sp>
         <p:nvSpPr>
           <p:cNvPr id="11" name="Rectangle 10">
@@ -18738,7 +18653,7 @@
 </p:sld>
 </file>
 
-<file path=ppt/slides/slide24.xml><?xml version="1.0" encoding="utf-8"?>
+<file path=ppt/slides/slide23.xml><?xml version="1.0" encoding="utf-8"?>
 <p:sld xmlns:a="http://schemas.openxmlformats.org/drawingml/2006/main" xmlns:r="http://schemas.openxmlformats.org/officeDocument/2006/relationships" xmlns:p="http://schemas.openxmlformats.org/presentationml/2006/main">
   <p:cSld>
     <p:bg>
@@ -19267,7 +19182,7 @@
         </p:blipFill>
         <p:spPr>
           <a:xfrm>
-            <a:off x="5054580" y="618067"/>
+            <a:off x="4849929" y="601201"/>
             <a:ext cx="6185809" cy="5598157"/>
           </a:xfrm>
           <a:prstGeom prst="rect">
@@ -19279,6 +19194,94 @@
     <p:extLst>
       <p:ext uri="{BB962C8B-B14F-4D97-AF65-F5344CB8AC3E}">
         <p14:creationId xmlns:p14="http://schemas.microsoft.com/office/powerpoint/2010/main" val="201829269"/>
+      </p:ext>
+    </p:extLst>
+  </p:cSld>
+  <p:clrMapOvr>
+    <a:masterClrMapping/>
+  </p:clrMapOvr>
+</p:sld>
+</file>
+
+<file path=ppt/slides/slide24.xml><?xml version="1.0" encoding="utf-8"?>
+<p:sld xmlns:a="http://schemas.openxmlformats.org/drawingml/2006/main" xmlns:r="http://schemas.openxmlformats.org/officeDocument/2006/relationships" xmlns:p="http://schemas.openxmlformats.org/presentationml/2006/main">
+  <p:cSld>
+    <p:spTree>
+      <p:nvGrpSpPr>
+        <p:cNvPr id="1" name=""/>
+        <p:cNvGrpSpPr/>
+        <p:nvPr/>
+      </p:nvGrpSpPr>
+      <p:grpSpPr>
+        <a:xfrm>
+          <a:off x="0" y="0"/>
+          <a:ext cx="0" cy="0"/>
+          <a:chOff x="0" y="0"/>
+          <a:chExt cx="0" cy="0"/>
+        </a:xfrm>
+      </p:grpSpPr>
+      <p:sp>
+        <p:nvSpPr>
+          <p:cNvPr id="2" name="Titel 1"/>
+          <p:cNvSpPr>
+            <a:spLocks noGrp="1"/>
+          </p:cNvSpPr>
+          <p:nvPr>
+            <p:ph type="title"/>
+          </p:nvPr>
+        </p:nvSpPr>
+        <p:spPr>
+          <a:xfrm>
+            <a:off x="581192" y="5264486"/>
+            <a:ext cx="10883444" cy="958513"/>
+          </a:xfrm>
+        </p:spPr>
+        <p:txBody>
+          <a:bodyPr anchor="ctr">
+            <a:normAutofit/>
+          </a:bodyPr>
+          <a:lstStyle/>
+          <a:p>
+            <a:r>
+              <a:rPr lang="en-GB" dirty="0">
+                <a:solidFill>
+                  <a:srgbClr val="FFFEFF"/>
+                </a:solidFill>
+              </a:rPr>
+              <a:t>First Iteration Balanced</a:t>
+            </a:r>
+          </a:p>
+        </p:txBody>
+      </p:sp>
+      <p:graphicFrame>
+        <p:nvGraphicFramePr>
+          <p:cNvPr id="14" name="Inhaltsplatzhalter 13"/>
+          <p:cNvGraphicFramePr>
+            <a:graphicFrameLocks noGrp="1"/>
+          </p:cNvGraphicFramePr>
+          <p:nvPr>
+            <p:ph idx="1"/>
+            <p:extLst>
+              <p:ext uri="{D42A27DB-BD31-4B8C-83A1-F6EECF244321}">
+                <p14:modId xmlns:p14="http://schemas.microsoft.com/office/powerpoint/2010/main" val="741152277"/>
+              </p:ext>
+            </p:extLst>
+          </p:nvPr>
+        </p:nvGraphicFramePr>
+        <p:xfrm>
+          <a:off x="642938" y="858445"/>
+          <a:ext cx="10906125" cy="3961205"/>
+        </p:xfrm>
+        <a:graphic>
+          <a:graphicData uri="http://schemas.openxmlformats.org/drawingml/2006/chart">
+            <c:chart xmlns:c="http://schemas.openxmlformats.org/drawingml/2006/chart" xmlns:r="http://schemas.openxmlformats.org/officeDocument/2006/relationships" r:id="rId3"/>
+          </a:graphicData>
+        </a:graphic>
+      </p:graphicFrame>
+    </p:spTree>
+    <p:extLst>
+      <p:ext uri="{BB962C8B-B14F-4D97-AF65-F5344CB8AC3E}">
+        <p14:creationId xmlns:p14="http://schemas.microsoft.com/office/powerpoint/2010/main" val="228595810"/>
       </p:ext>
     </p:extLst>
   </p:cSld>
@@ -19313,556 +19316,6 @@
           <a:chExt cx="0" cy="0"/>
         </a:xfrm>
       </p:grpSpPr>
-      <p:sp>
-        <p:nvSpPr>
-          <p:cNvPr id="27" name="Rectangle 26">
-            <a:extLst>
-              <a:ext uri="{FF2B5EF4-FFF2-40B4-BE49-F238E27FC236}">
-                <a16:creationId xmlns:a16="http://schemas.microsoft.com/office/drawing/2014/main" id="{DD651B61-325E-4E73-8445-38B0DE8AAAB6}"/>
-              </a:ext>
-              <a:ext uri="{C183D7F6-B498-43B3-948B-1728B52AA6E4}">
-                <adec:decorative xmlns:adec="http://schemas.microsoft.com/office/drawing/2017/decorative" val="1"/>
-              </a:ext>
-            </a:extLst>
-          </p:cNvPr>
-          <p:cNvSpPr>
-            <a:spLocks noGrp="1" noRot="1" noChangeAspect="1" noMove="1" noResize="1" noEditPoints="1" noAdjustHandles="1" noChangeArrowheads="1" noChangeShapeType="1" noTextEdit="1"/>
-          </p:cNvSpPr>
-          <p:nvPr>
-            <p:extLst>
-              <p:ext uri="{386F3935-93C4-4BCD-93E2-E3B085C9AB24}">
-                <p16:designElem xmlns:p16="http://schemas.microsoft.com/office/powerpoint/2015/main" val="1"/>
-              </p:ext>
-            </p:extLst>
-          </p:nvPr>
-        </p:nvSpPr>
-        <p:spPr>
-          <a:xfrm>
-            <a:off x="446534" y="457200"/>
-            <a:ext cx="3703320" cy="94997"/>
-          </a:xfrm>
-          <a:prstGeom prst="rect">
-            <a:avLst/>
-          </a:prstGeom>
-          <a:solidFill>
-            <a:srgbClr val="465359"/>
-          </a:solidFill>
-          <a:ln>
-            <a:noFill/>
-          </a:ln>
-          <a:effectLst/>
-        </p:spPr>
-        <p:style>
-          <a:lnRef idx="1">
-            <a:schemeClr val="accent1"/>
-          </a:lnRef>
-          <a:fillRef idx="3">
-            <a:schemeClr val="accent1"/>
-          </a:fillRef>
-          <a:effectRef idx="2">
-            <a:schemeClr val="accent1"/>
-          </a:effectRef>
-          <a:fontRef idx="minor">
-            <a:schemeClr val="lt1"/>
-          </a:fontRef>
-        </p:style>
-      </p:sp>
-      <p:sp>
-        <p:nvSpPr>
-          <p:cNvPr id="29" name="Rectangle 28">
-            <a:extLst>
-              <a:ext uri="{FF2B5EF4-FFF2-40B4-BE49-F238E27FC236}">
-                <a16:creationId xmlns:a16="http://schemas.microsoft.com/office/drawing/2014/main" id="{B42E5253-D3AC-4AC2-B766-8B34F13C2F5E}"/>
-              </a:ext>
-              <a:ext uri="{C183D7F6-B498-43B3-948B-1728B52AA6E4}">
-                <adec:decorative xmlns:adec="http://schemas.microsoft.com/office/drawing/2017/decorative" val="1"/>
-              </a:ext>
-            </a:extLst>
-          </p:cNvPr>
-          <p:cNvSpPr>
-            <a:spLocks noGrp="1" noRot="1" noChangeAspect="1" noMove="1" noResize="1" noEditPoints="1" noAdjustHandles="1" noChangeArrowheads="1" noChangeShapeType="1" noTextEdit="1"/>
-          </p:cNvSpPr>
-          <p:nvPr>
-            <p:extLst>
-              <p:ext uri="{386F3935-93C4-4BCD-93E2-E3B085C9AB24}">
-                <p16:designElem xmlns:p16="http://schemas.microsoft.com/office/powerpoint/2015/main" val="1"/>
-              </p:ext>
-            </p:extLst>
-          </p:nvPr>
-        </p:nvSpPr>
-        <p:spPr>
-          <a:xfrm>
-            <a:off x="8042147" y="453643"/>
-            <a:ext cx="3703320" cy="98554"/>
-          </a:xfrm>
-          <a:prstGeom prst="rect">
-            <a:avLst/>
-          </a:prstGeom>
-          <a:solidFill>
-            <a:srgbClr val="969FA7"/>
-          </a:solidFill>
-          <a:ln>
-            <a:noFill/>
-          </a:ln>
-          <a:effectLst/>
-        </p:spPr>
-        <p:style>
-          <a:lnRef idx="1">
-            <a:schemeClr val="accent1"/>
-          </a:lnRef>
-          <a:fillRef idx="3">
-            <a:schemeClr val="accent1"/>
-          </a:fillRef>
-          <a:effectRef idx="2">
-            <a:schemeClr val="accent1"/>
-          </a:effectRef>
-          <a:fontRef idx="minor">
-            <a:schemeClr val="lt1"/>
-          </a:fontRef>
-        </p:style>
-      </p:sp>
-      <p:sp>
-        <p:nvSpPr>
-          <p:cNvPr id="31" name="Rectangle 30">
-            <a:extLst>
-              <a:ext uri="{FF2B5EF4-FFF2-40B4-BE49-F238E27FC236}">
-                <a16:creationId xmlns:a16="http://schemas.microsoft.com/office/drawing/2014/main" id="{10AE8D57-436A-4073-9A75-15BB5949F8B4}"/>
-              </a:ext>
-              <a:ext uri="{C183D7F6-B498-43B3-948B-1728B52AA6E4}">
-                <adec:decorative xmlns:adec="http://schemas.microsoft.com/office/drawing/2017/decorative" val="1"/>
-              </a:ext>
-            </a:extLst>
-          </p:cNvPr>
-          <p:cNvSpPr>
-            <a:spLocks noGrp="1" noRot="1" noChangeAspect="1" noMove="1" noResize="1" noEditPoints="1" noAdjustHandles="1" noChangeArrowheads="1" noChangeShapeType="1" noTextEdit="1"/>
-          </p:cNvSpPr>
-          <p:nvPr>
-            <p:extLst>
-              <p:ext uri="{386F3935-93C4-4BCD-93E2-E3B085C9AB24}">
-                <p16:designElem xmlns:p16="http://schemas.microsoft.com/office/powerpoint/2015/main" val="1"/>
-              </p:ext>
-            </p:extLst>
-          </p:nvPr>
-        </p:nvSpPr>
-        <p:spPr>
-          <a:xfrm>
-            <a:off x="4241830" y="457200"/>
-            <a:ext cx="3703320" cy="91440"/>
-          </a:xfrm>
-          <a:prstGeom prst="rect">
-            <a:avLst/>
-          </a:prstGeom>
-          <a:solidFill>
-            <a:schemeClr val="accent1"/>
-          </a:solidFill>
-          <a:ln>
-            <a:noFill/>
-          </a:ln>
-          <a:effectLst/>
-        </p:spPr>
-        <p:style>
-          <a:lnRef idx="1">
-            <a:schemeClr val="accent1"/>
-          </a:lnRef>
-          <a:fillRef idx="3">
-            <a:schemeClr val="accent1"/>
-          </a:fillRef>
-          <a:effectRef idx="2">
-            <a:schemeClr val="accent1"/>
-          </a:effectRef>
-          <a:fontRef idx="minor">
-            <a:schemeClr val="lt1"/>
-          </a:fontRef>
-        </p:style>
-      </p:sp>
-      <p:sp>
-        <p:nvSpPr>
-          <p:cNvPr id="33" name="Rectangle 32">
-            <a:extLst>
-              <a:ext uri="{FF2B5EF4-FFF2-40B4-BE49-F238E27FC236}">
-                <a16:creationId xmlns:a16="http://schemas.microsoft.com/office/drawing/2014/main" id="{E2852671-8EB6-4EAF-8AF8-65CF3FD66456}"/>
-              </a:ext>
-              <a:ext uri="{C183D7F6-B498-43B3-948B-1728B52AA6E4}">
-                <adec:decorative xmlns:adec="http://schemas.microsoft.com/office/drawing/2017/decorative" val="1"/>
-              </a:ext>
-            </a:extLst>
-          </p:cNvPr>
-          <p:cNvSpPr>
-            <a:spLocks noGrp="1" noRot="1" noChangeAspect="1" noMove="1" noResize="1" noEditPoints="1" noAdjustHandles="1" noChangeArrowheads="1" noChangeShapeType="1" noTextEdit="1"/>
-          </p:cNvSpPr>
-          <p:nvPr>
-            <p:extLst>
-              <p:ext uri="{386F3935-93C4-4BCD-93E2-E3B085C9AB24}">
-                <p16:designElem xmlns:p16="http://schemas.microsoft.com/office/powerpoint/2015/main" val="1"/>
-              </p:ext>
-            </p:extLst>
-          </p:nvPr>
-        </p:nvSpPr>
-        <p:spPr>
-          <a:xfrm>
-            <a:off x="446534" y="3085764"/>
-            <a:ext cx="11298932" cy="3338149"/>
-          </a:xfrm>
-          <a:prstGeom prst="rect">
-            <a:avLst/>
-          </a:prstGeom>
-          <a:solidFill>
-            <a:srgbClr val="465359"/>
-          </a:solidFill>
-          <a:ln>
-            <a:noFill/>
-          </a:ln>
-          <a:effectLst/>
-        </p:spPr>
-        <p:style>
-          <a:lnRef idx="1">
-            <a:schemeClr val="accent1"/>
-          </a:lnRef>
-          <a:fillRef idx="3">
-            <a:schemeClr val="accent1"/>
-          </a:fillRef>
-          <a:effectRef idx="2">
-            <a:schemeClr val="accent1"/>
-          </a:effectRef>
-          <a:fontRef idx="minor">
-            <a:schemeClr val="lt1"/>
-          </a:fontRef>
-        </p:style>
-      </p:sp>
-      <p:sp useBgFill="1">
-        <p:nvSpPr>
-          <p:cNvPr id="35" name="Rectangle 34">
-            <a:extLst>
-              <a:ext uri="{FF2B5EF4-FFF2-40B4-BE49-F238E27FC236}">
-                <a16:creationId xmlns:a16="http://schemas.microsoft.com/office/drawing/2014/main" id="{26B4480E-B7FF-4481-890E-043A69AE6FE2}"/>
-              </a:ext>
-              <a:ext uri="{C183D7F6-B498-43B3-948B-1728B52AA6E4}">
-                <adec:decorative xmlns:adec="http://schemas.microsoft.com/office/drawing/2017/decorative" val="1"/>
-              </a:ext>
-            </a:extLst>
-          </p:cNvPr>
-          <p:cNvSpPr>
-            <a:spLocks noGrp="1" noRot="1" noChangeAspect="1" noMove="1" noResize="1" noEditPoints="1" noAdjustHandles="1" noChangeArrowheads="1" noChangeShapeType="1" noTextEdit="1"/>
-          </p:cNvSpPr>
-          <p:nvPr>
-            <p:extLst>
-              <p:ext uri="{386F3935-93C4-4BCD-93E2-E3B085C9AB24}">
-                <p16:designElem xmlns:p16="http://schemas.microsoft.com/office/powerpoint/2015/main" val="1"/>
-              </p:ext>
-            </p:extLst>
-          </p:nvPr>
-        </p:nvSpPr>
-        <p:spPr>
-          <a:xfrm>
-            <a:off x="0" y="0"/>
-            <a:ext cx="12192000" cy="6858000"/>
-          </a:xfrm>
-          <a:prstGeom prst="rect">
-            <a:avLst/>
-          </a:prstGeom>
-          <a:ln>
-            <a:noFill/>
-          </a:ln>
-        </p:spPr>
-        <p:style>
-          <a:lnRef idx="2">
-            <a:schemeClr val="accent1">
-              <a:shade val="50000"/>
-            </a:schemeClr>
-          </a:lnRef>
-          <a:fillRef idx="1">
-            <a:schemeClr val="accent1"/>
-          </a:fillRef>
-          <a:effectRef idx="0">
-            <a:schemeClr val="accent1"/>
-          </a:effectRef>
-          <a:fontRef idx="minor">
-            <a:schemeClr val="lt1"/>
-          </a:fontRef>
-        </p:style>
-        <p:txBody>
-          <a:bodyPr rtlCol="0" anchor="ctr"/>
-          <a:lstStyle/>
-          <a:p>
-            <a:pPr algn="ctr"/>
-            <a:endParaRPr lang="en-US"/>
-          </a:p>
-        </p:txBody>
-      </p:sp>
-      <p:grpSp>
-        <p:nvGrpSpPr>
-          <p:cNvPr id="37" name="Group 36">
-            <a:extLst>
-              <a:ext uri="{FF2B5EF4-FFF2-40B4-BE49-F238E27FC236}">
-                <a16:creationId xmlns:a16="http://schemas.microsoft.com/office/drawing/2014/main" id="{79394E1F-0B5F-497D-B2A6-8383A2A54834}"/>
-              </a:ext>
-              <a:ext uri="{C183D7F6-B498-43B3-948B-1728B52AA6E4}">
-                <adec:decorative xmlns:adec="http://schemas.microsoft.com/office/drawing/2017/decorative" val="1"/>
-              </a:ext>
-            </a:extLst>
-          </p:cNvPr>
-          <p:cNvGrpSpPr>
-            <a:grpSpLocks noGrp="1" noUngrp="1" noRot="1" noChangeAspect="1" noMove="1" noResize="1"/>
-          </p:cNvGrpSpPr>
-          <p:nvPr>
-            <p:extLst>
-              <p:ext uri="{386F3935-93C4-4BCD-93E2-E3B085C9AB24}">
-                <p16:designElem xmlns:p16="http://schemas.microsoft.com/office/powerpoint/2015/main" val="1"/>
-              </p:ext>
-            </p:extLst>
-          </p:nvPr>
-        </p:nvGrpSpPr>
-        <p:grpSpPr>
-          <a:xfrm>
-            <a:off x="438068" y="457200"/>
-            <a:ext cx="3703320" cy="5935133"/>
-            <a:chOff x="438068" y="457200"/>
-            <a:chExt cx="3703320" cy="5935133"/>
-          </a:xfrm>
-        </p:grpSpPr>
-        <p:sp>
-          <p:nvSpPr>
-            <p:cNvPr id="38" name="Rectangle 37">
-              <a:extLst>
-                <a:ext uri="{FF2B5EF4-FFF2-40B4-BE49-F238E27FC236}">
-                  <a16:creationId xmlns:a16="http://schemas.microsoft.com/office/drawing/2014/main" id="{1F1FF39A-AC3C-4066-9D4C-519AA22812EA}"/>
-                </a:ext>
-                <a:ext uri="{C183D7F6-B498-43B3-948B-1728B52AA6E4}">
-                  <adec:decorative xmlns:adec="http://schemas.microsoft.com/office/drawing/2017/decorative" val="1"/>
-                </a:ext>
-              </a:extLst>
-            </p:cNvPr>
-            <p:cNvSpPr/>
-            <p:nvPr>
-              <p:extLst>
-                <p:ext uri="{386F3935-93C4-4BCD-93E2-E3B085C9AB24}">
-                  <p16:designElem xmlns:p16="http://schemas.microsoft.com/office/powerpoint/2015/main" val="1"/>
-                </p:ext>
-              </p:extLst>
-            </p:nvPr>
-          </p:nvSpPr>
-          <p:spPr>
-            <a:xfrm>
-              <a:off x="438068" y="601201"/>
-              <a:ext cx="3702134" cy="5791132"/>
-            </a:xfrm>
-            <a:prstGeom prst="rect">
-              <a:avLst/>
-            </a:prstGeom>
-            <a:solidFill>
-              <a:srgbClr val="465359">
-                <a:alpha val="97000"/>
-              </a:srgbClr>
-            </a:solidFill>
-            <a:ln w="6350" cmpd="sng">
-              <a:noFill/>
-            </a:ln>
-            <a:effectLst/>
-          </p:spPr>
-          <p:style>
-            <a:lnRef idx="1">
-              <a:schemeClr val="accent1"/>
-            </a:lnRef>
-            <a:fillRef idx="3">
-              <a:schemeClr val="accent1"/>
-            </a:fillRef>
-            <a:effectRef idx="2">
-              <a:schemeClr val="accent1"/>
-            </a:effectRef>
-            <a:fontRef idx="minor">
-              <a:schemeClr val="lt1"/>
-            </a:fontRef>
-          </p:style>
-        </p:sp>
-        <p:sp>
-          <p:nvSpPr>
-            <p:cNvPr id="39" name="Rectangle 38">
-              <a:extLst>
-                <a:ext uri="{FF2B5EF4-FFF2-40B4-BE49-F238E27FC236}">
-                  <a16:creationId xmlns:a16="http://schemas.microsoft.com/office/drawing/2014/main" id="{64C13BAB-7C00-4D21-A857-E3D41C0A2A66}"/>
-                </a:ext>
-                <a:ext uri="{C183D7F6-B498-43B3-948B-1728B52AA6E4}">
-                  <adec:decorative xmlns:adec="http://schemas.microsoft.com/office/drawing/2017/decorative" val="1"/>
-                </a:ext>
-              </a:extLst>
-            </p:cNvPr>
-            <p:cNvSpPr/>
-            <p:nvPr>
-              <p:extLst>
-                <p:ext uri="{386F3935-93C4-4BCD-93E2-E3B085C9AB24}">
-                  <p16:designElem xmlns:p16="http://schemas.microsoft.com/office/powerpoint/2015/main" val="1"/>
-                </p:ext>
-              </p:extLst>
-            </p:nvPr>
-          </p:nvSpPr>
-          <p:spPr>
-            <a:xfrm>
-              <a:off x="438068" y="457200"/>
-              <a:ext cx="3703320" cy="94997"/>
-            </a:xfrm>
-            <a:prstGeom prst="rect">
-              <a:avLst/>
-            </a:prstGeom>
-            <a:solidFill>
-              <a:srgbClr val="465359"/>
-            </a:solidFill>
-            <a:ln>
-              <a:noFill/>
-            </a:ln>
-            <a:effectLst/>
-          </p:spPr>
-          <p:style>
-            <a:lnRef idx="1">
-              <a:schemeClr val="accent1"/>
-            </a:lnRef>
-            <a:fillRef idx="3">
-              <a:schemeClr val="accent1"/>
-            </a:fillRef>
-            <a:effectRef idx="2">
-              <a:schemeClr val="accent1"/>
-            </a:effectRef>
-            <a:fontRef idx="minor">
-              <a:schemeClr val="lt1"/>
-            </a:fontRef>
-          </p:style>
-        </p:sp>
-      </p:grpSp>
-      <p:sp>
-        <p:nvSpPr>
-          <p:cNvPr id="2" name="Titel 1">
-            <a:extLst>
-              <a:ext uri="{FF2B5EF4-FFF2-40B4-BE49-F238E27FC236}">
-                <a16:creationId xmlns:a16="http://schemas.microsoft.com/office/drawing/2014/main" id="{06158C18-B0AD-4A23-BB2F-A981A9ADFAF7}"/>
-              </a:ext>
-            </a:extLst>
-          </p:cNvPr>
-          <p:cNvSpPr>
-            <a:spLocks noGrp="1"/>
-          </p:cNvSpPr>
-          <p:nvPr>
-            <p:ph type="title"/>
-          </p:nvPr>
-        </p:nvSpPr>
-        <p:spPr>
-          <a:xfrm>
-            <a:off x="584200" y="1524001"/>
-            <a:ext cx="3412067" cy="3478384"/>
-          </a:xfrm>
-        </p:spPr>
-        <p:txBody>
-          <a:bodyPr vert="horz" lIns="91440" tIns="45720" rIns="91440" bIns="45720" rtlCol="0" anchor="b">
-            <a:normAutofit/>
-          </a:bodyPr>
-          <a:lstStyle/>
-          <a:p>
-            <a:r>
-              <a:rPr lang="en-US" sz="3600" dirty="0">
-                <a:solidFill>
-                  <a:srgbClr val="FFFFFF"/>
-                </a:solidFill>
-              </a:rPr>
-              <a:t>Second Iteration </a:t>
-            </a:r>
-            <a:br>
-              <a:rPr lang="en-US" sz="3600" dirty="0">
-                <a:solidFill>
-                  <a:srgbClr val="FFFFFF"/>
-                </a:solidFill>
-              </a:rPr>
-            </a:br>
-            <a:r>
-              <a:rPr lang="en-US" sz="3600" dirty="0">
-                <a:solidFill>
-                  <a:srgbClr val="FFFFFF"/>
-                </a:solidFill>
-              </a:rPr>
-              <a:t>Modeling Result – ROC</a:t>
-            </a:r>
-            <a:br>
-              <a:rPr lang="en-US" sz="3600" dirty="0">
-                <a:solidFill>
-                  <a:srgbClr val="FFFFFF"/>
-                </a:solidFill>
-              </a:rPr>
-            </a:br>
-            <a:endParaRPr lang="en-US" sz="3600" dirty="0">
-              <a:solidFill>
-                <a:srgbClr val="FFFFFF"/>
-              </a:solidFill>
-            </a:endParaRPr>
-          </a:p>
-        </p:txBody>
-      </p:sp>
-      <p:pic>
-        <p:nvPicPr>
-          <p:cNvPr id="9" name="Inhaltsplatzhalter 8">
-            <a:extLst>
-              <a:ext uri="{FF2B5EF4-FFF2-40B4-BE49-F238E27FC236}">
-                <a16:creationId xmlns:a16="http://schemas.microsoft.com/office/drawing/2014/main" id="{1C12F868-1325-2FAA-8038-BC9A3E042E60}"/>
-              </a:ext>
-            </a:extLst>
-          </p:cNvPr>
-          <p:cNvPicPr>
-            <a:picLocks noGrp="1" noChangeAspect="1"/>
-          </p:cNvPicPr>
-          <p:nvPr>
-            <p:ph idx="1"/>
-          </p:nvPr>
-        </p:nvPicPr>
-        <p:blipFill>
-          <a:blip r:embed="rId3"/>
-          <a:stretch>
-            <a:fillRect/>
-          </a:stretch>
-        </p:blipFill>
-        <p:spPr>
-          <a:xfrm>
-            <a:off x="5054580" y="618067"/>
-            <a:ext cx="6185809" cy="5598157"/>
-          </a:xfrm>
-          <a:prstGeom prst="rect">
-            <a:avLst/>
-          </a:prstGeom>
-        </p:spPr>
-      </p:pic>
-    </p:spTree>
-    <p:extLst>
-      <p:ext uri="{BB962C8B-B14F-4D97-AF65-F5344CB8AC3E}">
-        <p14:creationId xmlns:p14="http://schemas.microsoft.com/office/powerpoint/2010/main" val="3841831720"/>
-      </p:ext>
-    </p:extLst>
-  </p:cSld>
-  <p:clrMapOvr>
-    <a:masterClrMapping/>
-  </p:clrMapOvr>
-</p:sld>
-</file>
-
-<file path=ppt/slides/slide26.xml><?xml version="1.0" encoding="utf-8"?>
-<p:sld xmlns:a="http://schemas.openxmlformats.org/drawingml/2006/main" xmlns:r="http://schemas.openxmlformats.org/officeDocument/2006/relationships" xmlns:p="http://schemas.openxmlformats.org/presentationml/2006/main">
-  <p:cSld>
-    <p:bg>
-      <p:bgPr>
-        <a:solidFill>
-          <a:schemeClr val="bg1"/>
-        </a:solidFill>
-        <a:effectLst/>
-      </p:bgPr>
-    </p:bg>
-    <p:spTree>
-      <p:nvGrpSpPr>
-        <p:cNvPr id="1" name=""/>
-        <p:cNvGrpSpPr/>
-        <p:nvPr/>
-      </p:nvGrpSpPr>
-      <p:grpSpPr>
-        <a:xfrm>
-          <a:off x="0" y="0"/>
-          <a:ext cx="0" cy="0"/>
-          <a:chOff x="0" y="0"/>
-          <a:chExt cx="0" cy="0"/>
-        </a:xfrm>
-      </p:grpSpPr>
       <p:graphicFrame>
         <p:nvGraphicFramePr>
           <p:cNvPr id="14" name="Inhaltsplatzhalter 13"/>
@@ -19873,7 +19326,7 @@
             <p:ph idx="1"/>
             <p:extLst>
               <p:ext uri="{D42A27DB-BD31-4B8C-83A1-F6EECF244321}">
-                <p14:modId xmlns:p14="http://schemas.microsoft.com/office/powerpoint/2010/main" val="3310706488"/>
+                <p14:modId xmlns:p14="http://schemas.microsoft.com/office/powerpoint/2010/main" val="1299656794"/>
               </p:ext>
             </p:extLst>
           </p:nvPr>

</xml_diff>